<commit_message>
Web Development lectures and exercise updated
</commit_message>
<xml_diff>
--- a/Web Development/Lectures/11th, 12th Week Lecture.pptx
+++ b/Web Development/Lectures/11th, 12th Week Lecture.pptx
@@ -6,7 +6,13 @@
   </p:sldMasterIdLst>
   <p:sldIdLst>
     <p:sldId id="256" r:id="rId2"/>
-    <p:sldId id="257" r:id="rId3"/>
+    <p:sldId id="258" r:id="rId3"/>
+    <p:sldId id="263" r:id="rId4"/>
+    <p:sldId id="264" r:id="rId5"/>
+    <p:sldId id="265" r:id="rId6"/>
+    <p:sldId id="266" r:id="rId7"/>
+    <p:sldId id="267" r:id="rId8"/>
+    <p:sldId id="257" r:id="rId9"/>
   </p:sldIdLst>
   <p:sldSz cx="12192000" cy="6858000"/>
   <p:notesSz cx="6858000" cy="9144000"/>
@@ -835,7 +841,7 @@
           <a:p>
             <a:fld id="{F92B177F-34A6-4B22-B4DE-0B5E1D1AE6C4}" type="datetimeFigureOut">
               <a:rPr lang="en-US" smtClean="0"/>
-              <a:t>5/6/2024</a:t>
+              <a:t>5/13/2024</a:t>
             </a:fld>
             <a:endParaRPr lang="en-US"/>
           </a:p>
@@ -1086,7 +1092,7 @@
           <a:p>
             <a:fld id="{F92B177F-34A6-4B22-B4DE-0B5E1D1AE6C4}" type="datetimeFigureOut">
               <a:rPr lang="en-US" smtClean="0"/>
-              <a:t>5/6/2024</a:t>
+              <a:t>5/13/2024</a:t>
             </a:fld>
             <a:endParaRPr lang="en-US"/>
           </a:p>
@@ -1400,7 +1406,7 @@
           <a:p>
             <a:fld id="{F92B177F-34A6-4B22-B4DE-0B5E1D1AE6C4}" type="datetimeFigureOut">
               <a:rPr lang="en-US" smtClean="0"/>
-              <a:t>5/6/2024</a:t>
+              <a:t>5/13/2024</a:t>
             </a:fld>
             <a:endParaRPr lang="en-US"/>
           </a:p>
@@ -1741,7 +1747,7 @@
           <a:p>
             <a:fld id="{F92B177F-34A6-4B22-B4DE-0B5E1D1AE6C4}" type="datetimeFigureOut">
               <a:rPr lang="en-US" smtClean="0"/>
-              <a:t>5/6/2024</a:t>
+              <a:t>5/13/2024</a:t>
             </a:fld>
             <a:endParaRPr lang="en-US"/>
           </a:p>
@@ -2055,7 +2061,7 @@
           <a:p>
             <a:fld id="{F92B177F-34A6-4B22-B4DE-0B5E1D1AE6C4}" type="datetimeFigureOut">
               <a:rPr lang="en-US" smtClean="0"/>
-              <a:t>5/6/2024</a:t>
+              <a:t>5/13/2024</a:t>
             </a:fld>
             <a:endParaRPr lang="en-US"/>
           </a:p>
@@ -2448,7 +2454,7 @@
           <a:p>
             <a:fld id="{F92B177F-34A6-4B22-B4DE-0B5E1D1AE6C4}" type="datetimeFigureOut">
               <a:rPr lang="en-US" smtClean="0"/>
-              <a:t>5/6/2024</a:t>
+              <a:t>5/13/2024</a:t>
             </a:fld>
             <a:endParaRPr lang="en-US"/>
           </a:p>
@@ -2618,7 +2624,7 @@
           <a:p>
             <a:fld id="{F92B177F-34A6-4B22-B4DE-0B5E1D1AE6C4}" type="datetimeFigureOut">
               <a:rPr lang="en-US" smtClean="0"/>
-              <a:t>5/6/2024</a:t>
+              <a:t>5/13/2024</a:t>
             </a:fld>
             <a:endParaRPr lang="en-US"/>
           </a:p>
@@ -2798,7 +2804,7 @@
           <a:p>
             <a:fld id="{F92B177F-34A6-4B22-B4DE-0B5E1D1AE6C4}" type="datetimeFigureOut">
               <a:rPr lang="en-US" smtClean="0"/>
-              <a:t>5/6/2024</a:t>
+              <a:t>5/13/2024</a:t>
             </a:fld>
             <a:endParaRPr lang="en-US"/>
           </a:p>
@@ -2974,7 +2980,7 @@
           <a:p>
             <a:fld id="{F92B177F-34A6-4B22-B4DE-0B5E1D1AE6C4}" type="datetimeFigureOut">
               <a:rPr lang="en-US" smtClean="0"/>
-              <a:t>5/6/2024</a:t>
+              <a:t>5/13/2024</a:t>
             </a:fld>
             <a:endParaRPr lang="en-US"/>
           </a:p>
@@ -3221,7 +3227,7 @@
           <a:p>
             <a:fld id="{F92B177F-34A6-4B22-B4DE-0B5E1D1AE6C4}" type="datetimeFigureOut">
               <a:rPr lang="en-US" smtClean="0"/>
-              <a:t>5/6/2024</a:t>
+              <a:t>5/13/2024</a:t>
             </a:fld>
             <a:endParaRPr lang="en-US"/>
           </a:p>
@@ -3453,7 +3459,7 @@
           <a:p>
             <a:fld id="{F92B177F-34A6-4B22-B4DE-0B5E1D1AE6C4}" type="datetimeFigureOut">
               <a:rPr lang="en-US" smtClean="0"/>
-              <a:t>5/6/2024</a:t>
+              <a:t>5/13/2024</a:t>
             </a:fld>
             <a:endParaRPr lang="en-US"/>
           </a:p>
@@ -3827,7 +3833,7 @@
           <a:p>
             <a:fld id="{F92B177F-34A6-4B22-B4DE-0B5E1D1AE6C4}" type="datetimeFigureOut">
               <a:rPr lang="en-US" smtClean="0"/>
-              <a:t>5/6/2024</a:t>
+              <a:t>5/13/2024</a:t>
             </a:fld>
             <a:endParaRPr lang="en-US"/>
           </a:p>
@@ -3950,7 +3956,7 @@
           <a:p>
             <a:fld id="{F92B177F-34A6-4B22-B4DE-0B5E1D1AE6C4}" type="datetimeFigureOut">
               <a:rPr lang="en-US" smtClean="0"/>
-              <a:t>5/6/2024</a:t>
+              <a:t>5/13/2024</a:t>
             </a:fld>
             <a:endParaRPr lang="en-US"/>
           </a:p>
@@ -4045,7 +4051,7 @@
           <a:p>
             <a:fld id="{F92B177F-34A6-4B22-B4DE-0B5E1D1AE6C4}" type="datetimeFigureOut">
               <a:rPr lang="en-US" smtClean="0"/>
-              <a:t>5/6/2024</a:t>
+              <a:t>5/13/2024</a:t>
             </a:fld>
             <a:endParaRPr lang="en-US"/>
           </a:p>
@@ -4300,7 +4306,7 @@
           <a:p>
             <a:fld id="{F92B177F-34A6-4B22-B4DE-0B5E1D1AE6C4}" type="datetimeFigureOut">
               <a:rPr lang="en-US" smtClean="0"/>
-              <a:t>5/6/2024</a:t>
+              <a:t>5/13/2024</a:t>
             </a:fld>
             <a:endParaRPr lang="en-US"/>
           </a:p>
@@ -4563,7 +4569,7 @@
           <a:p>
             <a:fld id="{F92B177F-34A6-4B22-B4DE-0B5E1D1AE6C4}" type="datetimeFigureOut">
               <a:rPr lang="en-US" smtClean="0"/>
-              <a:t>5/6/2024</a:t>
+              <a:t>5/13/2024</a:t>
             </a:fld>
             <a:endParaRPr lang="en-US"/>
           </a:p>
@@ -5306,7 +5312,7 @@
           <a:p>
             <a:fld id="{F92B177F-34A6-4B22-B4DE-0B5E1D1AE6C4}" type="datetimeFigureOut">
               <a:rPr lang="en-US" smtClean="0"/>
-              <a:t>5/6/2024</a:t>
+              <a:t>5/13/2024</a:t>
             </a:fld>
             <a:endParaRPr lang="en-US"/>
           </a:p>
@@ -6071,7 +6077,7 @@
                 <a:latin typeface="Times New Roman" panose="02020603050405020304" pitchFamily="18" charset="0"/>
                 <a:cs typeface="Times New Roman" panose="02020603050405020304" pitchFamily="18" charset="0"/>
               </a:rPr>
-              <a:t>Laravel Relationships</a:t>
+              <a:t>Laravel Rest API’s</a:t>
             </a:r>
           </a:p>
           <a:p>
@@ -6087,7 +6093,7 @@
                 <a:latin typeface="Times New Roman" panose="02020603050405020304" pitchFamily="18" charset="0"/>
                 <a:cs typeface="Times New Roman" panose="02020603050405020304" pitchFamily="18" charset="0"/>
               </a:rPr>
-              <a:t>Laravel Security </a:t>
+              <a:t>Final Project Evaluation</a:t>
             </a:r>
           </a:p>
           <a:p>
@@ -6103,7 +6109,7 @@
                 <a:latin typeface="Times New Roman" panose="02020603050405020304" pitchFamily="18" charset="0"/>
                 <a:cs typeface="Times New Roman" panose="02020603050405020304" pitchFamily="18" charset="0"/>
               </a:rPr>
-              <a:t>Crud Application</a:t>
+              <a:t>Final Term Exam</a:t>
             </a:r>
           </a:p>
           <a:p>
@@ -6138,6 +6144,1791 @@
 </file>
 
 <file path=ppt/slides/slide2.xml><?xml version="1.0" encoding="utf-8"?>
+<p:sld xmlns:a="http://schemas.openxmlformats.org/drawingml/2006/main" xmlns:r="http://schemas.openxmlformats.org/officeDocument/2006/relationships" xmlns:p="http://schemas.openxmlformats.org/presentationml/2006/main">
+  <p:cSld>
+    <p:spTree>
+      <p:nvGrpSpPr>
+        <p:cNvPr id="1" name=""/>
+        <p:cNvGrpSpPr/>
+        <p:nvPr/>
+      </p:nvGrpSpPr>
+      <p:grpSpPr>
+        <a:xfrm>
+          <a:off x="0" y="0"/>
+          <a:ext cx="0" cy="0"/>
+          <a:chOff x="0" y="0"/>
+          <a:chExt cx="0" cy="0"/>
+        </a:xfrm>
+      </p:grpSpPr>
+      <p:pic>
+        <p:nvPicPr>
+          <p:cNvPr id="7" name="Picture 6">
+            <a:extLst>
+              <a:ext uri="{FF2B5EF4-FFF2-40B4-BE49-F238E27FC236}">
+                <a16:creationId xmlns:a16="http://schemas.microsoft.com/office/drawing/2014/main" id="{AD277A71-C5A3-2B53-25AA-A52C92EF6CC4}"/>
+              </a:ext>
+            </a:extLst>
+          </p:cNvPr>
+          <p:cNvPicPr>
+            <a:picLocks noChangeAspect="1"/>
+          </p:cNvPicPr>
+          <p:nvPr/>
+        </p:nvPicPr>
+        <p:blipFill>
+          <a:blip r:embed="rId2">
+            <a:extLst>
+              <a:ext uri="{28A0092B-C50C-407E-A947-70E740481C1C}">
+                <a14:useLocalDpi xmlns:a14="http://schemas.microsoft.com/office/drawing/2010/main" val="0"/>
+              </a:ext>
+            </a:extLst>
+          </a:blip>
+          <a:stretch>
+            <a:fillRect/>
+          </a:stretch>
+        </p:blipFill>
+        <p:spPr>
+          <a:xfrm>
+            <a:off x="0" y="4844958"/>
+            <a:ext cx="1915235" cy="1915235"/>
+          </a:xfrm>
+          <a:prstGeom prst="rect">
+            <a:avLst/>
+          </a:prstGeom>
+        </p:spPr>
+      </p:pic>
+      <p:sp>
+        <p:nvSpPr>
+          <p:cNvPr id="8" name="TextBox 7">
+            <a:extLst>
+              <a:ext uri="{FF2B5EF4-FFF2-40B4-BE49-F238E27FC236}">
+                <a16:creationId xmlns:a16="http://schemas.microsoft.com/office/drawing/2014/main" id="{0835D244-D79F-8F6B-3481-116553499408}"/>
+              </a:ext>
+            </a:extLst>
+          </p:cNvPr>
+          <p:cNvSpPr txBox="1"/>
+          <p:nvPr/>
+        </p:nvSpPr>
+        <p:spPr>
+          <a:xfrm>
+            <a:off x="9778558" y="259307"/>
+            <a:ext cx="2536272" cy="461665"/>
+          </a:xfrm>
+          <a:prstGeom prst="rect">
+            <a:avLst/>
+          </a:prstGeom>
+          <a:noFill/>
+        </p:spPr>
+        <p:txBody>
+          <a:bodyPr wrap="square" rtlCol="0">
+            <a:spAutoFit/>
+          </a:bodyPr>
+          <a:lstStyle/>
+          <a:p>
+            <a:r>
+              <a:rPr lang="en-US" sz="2400" b="1" dirty="0">
+                <a:solidFill>
+                  <a:schemeClr val="bg1"/>
+                </a:solidFill>
+                <a:latin typeface="Arial Black" panose="020B0A04020102020204" pitchFamily="34" charset="0"/>
+              </a:rPr>
+              <a:t>AI Academy</a:t>
+            </a:r>
+            <a:r>
+              <a:rPr lang="en-US" sz="2400" b="0" i="0" dirty="0">
+                <a:solidFill>
+                  <a:schemeClr val="bg1"/>
+                </a:solidFill>
+                <a:effectLst/>
+                <a:latin typeface="arial" panose="020B0604020202020204" pitchFamily="34" charset="0"/>
+              </a:rPr>
+              <a:t>®</a:t>
+            </a:r>
+            <a:endParaRPr lang="en-US" sz="2400" b="1" dirty="0">
+              <a:solidFill>
+                <a:schemeClr val="bg1"/>
+              </a:solidFill>
+              <a:latin typeface="Arial Black" panose="020B0A04020102020204" pitchFamily="34" charset="0"/>
+            </a:endParaRPr>
+          </a:p>
+        </p:txBody>
+      </p:sp>
+      <p:sp>
+        <p:nvSpPr>
+          <p:cNvPr id="13" name="Scroll: Vertical 12">
+            <a:extLst>
+              <a:ext uri="{FF2B5EF4-FFF2-40B4-BE49-F238E27FC236}">
+                <a16:creationId xmlns:a16="http://schemas.microsoft.com/office/drawing/2014/main" id="{BB80B18F-2B14-894E-57C6-EC163F824025}"/>
+              </a:ext>
+            </a:extLst>
+          </p:cNvPr>
+          <p:cNvSpPr/>
+          <p:nvPr/>
+        </p:nvSpPr>
+        <p:spPr>
+          <a:xfrm>
+            <a:off x="10459839" y="887102"/>
+            <a:ext cx="1091821" cy="873457"/>
+          </a:xfrm>
+          <a:prstGeom prst="verticalScroll">
+            <a:avLst/>
+          </a:prstGeom>
+          <a:solidFill>
+            <a:schemeClr val="bg1"/>
+          </a:solidFill>
+        </p:spPr>
+        <p:style>
+          <a:lnRef idx="2">
+            <a:schemeClr val="accent1">
+              <a:shade val="15000"/>
+            </a:schemeClr>
+          </a:lnRef>
+          <a:fillRef idx="1">
+            <a:schemeClr val="accent1"/>
+          </a:fillRef>
+          <a:effectRef idx="0">
+            <a:schemeClr val="accent1"/>
+          </a:effectRef>
+          <a:fontRef idx="minor">
+            <a:schemeClr val="lt1"/>
+          </a:fontRef>
+        </p:style>
+        <p:txBody>
+          <a:bodyPr rtlCol="0" anchor="ctr"/>
+          <a:lstStyle/>
+          <a:p>
+            <a:pPr algn="ctr"/>
+            <a:r>
+              <a:rPr lang="en-US" sz="4400" b="1" dirty="0">
+                <a:solidFill>
+                  <a:schemeClr val="tx1"/>
+                </a:solidFill>
+              </a:rPr>
+              <a:t>2</a:t>
+            </a:r>
+          </a:p>
+        </p:txBody>
+      </p:sp>
+      <p:sp>
+        <p:nvSpPr>
+          <p:cNvPr id="14" name="TextBox 13">
+            <a:extLst>
+              <a:ext uri="{FF2B5EF4-FFF2-40B4-BE49-F238E27FC236}">
+                <a16:creationId xmlns:a16="http://schemas.microsoft.com/office/drawing/2014/main" id="{5E9C113D-AE55-F3B3-E221-1D8CA4D0EC80}"/>
+              </a:ext>
+            </a:extLst>
+          </p:cNvPr>
+          <p:cNvSpPr txBox="1"/>
+          <p:nvPr/>
+        </p:nvSpPr>
+        <p:spPr>
+          <a:xfrm>
+            <a:off x="1109533" y="259307"/>
+            <a:ext cx="4093941" cy="707886"/>
+          </a:xfrm>
+          <a:prstGeom prst="rect">
+            <a:avLst/>
+          </a:prstGeom>
+          <a:noFill/>
+        </p:spPr>
+        <p:txBody>
+          <a:bodyPr wrap="none" rtlCol="0">
+            <a:spAutoFit/>
+          </a:bodyPr>
+          <a:lstStyle/>
+          <a:p>
+            <a:r>
+              <a:rPr lang="en-US" sz="4000" b="1" dirty="0">
+                <a:latin typeface="Arial Black" panose="020B0A04020102020204" pitchFamily="34" charset="0"/>
+              </a:rPr>
+              <a:t>Week #11,#12</a:t>
+            </a:r>
+          </a:p>
+        </p:txBody>
+      </p:sp>
+      <p:pic>
+        <p:nvPicPr>
+          <p:cNvPr id="3" name="Picture 2">
+            <a:extLst>
+              <a:ext uri="{FF2B5EF4-FFF2-40B4-BE49-F238E27FC236}">
+                <a16:creationId xmlns:a16="http://schemas.microsoft.com/office/drawing/2014/main" id="{DBCC60DA-9DC1-6616-B863-295E5CC38F69}"/>
+              </a:ext>
+            </a:extLst>
+          </p:cNvPr>
+          <p:cNvPicPr>
+            <a:picLocks noChangeAspect="1"/>
+          </p:cNvPicPr>
+          <p:nvPr/>
+        </p:nvPicPr>
+        <p:blipFill>
+          <a:blip r:embed="rId3">
+            <a:extLst>
+              <a:ext uri="{28A0092B-C50C-407E-A947-70E740481C1C}">
+                <a14:useLocalDpi xmlns:a14="http://schemas.microsoft.com/office/drawing/2010/main" val="0"/>
+              </a:ext>
+            </a:extLst>
+          </a:blip>
+          <a:stretch>
+            <a:fillRect/>
+          </a:stretch>
+        </p:blipFill>
+        <p:spPr>
+          <a:xfrm>
+            <a:off x="1500626" y="1009397"/>
+            <a:ext cx="4792399" cy="538050"/>
+          </a:xfrm>
+          <a:prstGeom prst="rect">
+            <a:avLst/>
+          </a:prstGeom>
+        </p:spPr>
+      </p:pic>
+      <p:pic>
+        <p:nvPicPr>
+          <p:cNvPr id="5" name="Picture 4">
+            <a:extLst>
+              <a:ext uri="{FF2B5EF4-FFF2-40B4-BE49-F238E27FC236}">
+                <a16:creationId xmlns:a16="http://schemas.microsoft.com/office/drawing/2014/main" id="{1FAE0A2B-C001-E684-A67F-0D32C8C7E2E6}"/>
+              </a:ext>
+            </a:extLst>
+          </p:cNvPr>
+          <p:cNvPicPr>
+            <a:picLocks noChangeAspect="1"/>
+          </p:cNvPicPr>
+          <p:nvPr/>
+        </p:nvPicPr>
+        <p:blipFill>
+          <a:blip r:embed="rId4">
+            <a:extLst>
+              <a:ext uri="{28A0092B-C50C-407E-A947-70E740481C1C}">
+                <a14:useLocalDpi xmlns:a14="http://schemas.microsoft.com/office/drawing/2010/main" val="0"/>
+              </a:ext>
+            </a:extLst>
+          </a:blip>
+          <a:stretch>
+            <a:fillRect/>
+          </a:stretch>
+        </p:blipFill>
+        <p:spPr>
+          <a:xfrm>
+            <a:off x="1915235" y="1685935"/>
+            <a:ext cx="7778843" cy="3823685"/>
+          </a:xfrm>
+          <a:prstGeom prst="rect">
+            <a:avLst/>
+          </a:prstGeom>
+        </p:spPr>
+      </p:pic>
+    </p:spTree>
+    <p:extLst>
+      <p:ext uri="{BB962C8B-B14F-4D97-AF65-F5344CB8AC3E}">
+        <p14:creationId xmlns:p14="http://schemas.microsoft.com/office/powerpoint/2010/main" val="4263538593"/>
+      </p:ext>
+    </p:extLst>
+  </p:cSld>
+  <p:clrMapOvr>
+    <a:masterClrMapping/>
+  </p:clrMapOvr>
+</p:sld>
+</file>
+
+<file path=ppt/slides/slide3.xml><?xml version="1.0" encoding="utf-8"?>
+<p:sld xmlns:a="http://schemas.openxmlformats.org/drawingml/2006/main" xmlns:r="http://schemas.openxmlformats.org/officeDocument/2006/relationships" xmlns:p="http://schemas.openxmlformats.org/presentationml/2006/main">
+  <p:cSld>
+    <p:spTree>
+      <p:nvGrpSpPr>
+        <p:cNvPr id="1" name=""/>
+        <p:cNvGrpSpPr/>
+        <p:nvPr/>
+      </p:nvGrpSpPr>
+      <p:grpSpPr>
+        <a:xfrm>
+          <a:off x="0" y="0"/>
+          <a:ext cx="0" cy="0"/>
+          <a:chOff x="0" y="0"/>
+          <a:chExt cx="0" cy="0"/>
+        </a:xfrm>
+      </p:grpSpPr>
+      <p:pic>
+        <p:nvPicPr>
+          <p:cNvPr id="7" name="Picture 6">
+            <a:extLst>
+              <a:ext uri="{FF2B5EF4-FFF2-40B4-BE49-F238E27FC236}">
+                <a16:creationId xmlns:a16="http://schemas.microsoft.com/office/drawing/2014/main" id="{AD277A71-C5A3-2B53-25AA-A52C92EF6CC4}"/>
+              </a:ext>
+            </a:extLst>
+          </p:cNvPr>
+          <p:cNvPicPr>
+            <a:picLocks noChangeAspect="1"/>
+          </p:cNvPicPr>
+          <p:nvPr/>
+        </p:nvPicPr>
+        <p:blipFill>
+          <a:blip r:embed="rId2">
+            <a:extLst>
+              <a:ext uri="{28A0092B-C50C-407E-A947-70E740481C1C}">
+                <a14:useLocalDpi xmlns:a14="http://schemas.microsoft.com/office/drawing/2010/main" val="0"/>
+              </a:ext>
+            </a:extLst>
+          </a:blip>
+          <a:stretch>
+            <a:fillRect/>
+          </a:stretch>
+        </p:blipFill>
+        <p:spPr>
+          <a:xfrm>
+            <a:off x="0" y="4844958"/>
+            <a:ext cx="1915235" cy="1915235"/>
+          </a:xfrm>
+          <a:prstGeom prst="rect">
+            <a:avLst/>
+          </a:prstGeom>
+        </p:spPr>
+      </p:pic>
+      <p:sp>
+        <p:nvSpPr>
+          <p:cNvPr id="8" name="TextBox 7">
+            <a:extLst>
+              <a:ext uri="{FF2B5EF4-FFF2-40B4-BE49-F238E27FC236}">
+                <a16:creationId xmlns:a16="http://schemas.microsoft.com/office/drawing/2014/main" id="{0835D244-D79F-8F6B-3481-116553499408}"/>
+              </a:ext>
+            </a:extLst>
+          </p:cNvPr>
+          <p:cNvSpPr txBox="1"/>
+          <p:nvPr/>
+        </p:nvSpPr>
+        <p:spPr>
+          <a:xfrm>
+            <a:off x="9778558" y="259307"/>
+            <a:ext cx="2536272" cy="461665"/>
+          </a:xfrm>
+          <a:prstGeom prst="rect">
+            <a:avLst/>
+          </a:prstGeom>
+          <a:noFill/>
+        </p:spPr>
+        <p:txBody>
+          <a:bodyPr wrap="square" rtlCol="0">
+            <a:spAutoFit/>
+          </a:bodyPr>
+          <a:lstStyle/>
+          <a:p>
+            <a:r>
+              <a:rPr lang="en-US" sz="2400" b="1" dirty="0">
+                <a:solidFill>
+                  <a:schemeClr val="bg1"/>
+                </a:solidFill>
+                <a:latin typeface="Arial Black" panose="020B0A04020102020204" pitchFamily="34" charset="0"/>
+              </a:rPr>
+              <a:t>AI Academy</a:t>
+            </a:r>
+            <a:r>
+              <a:rPr lang="en-US" sz="2400" b="0" i="0" dirty="0">
+                <a:solidFill>
+                  <a:schemeClr val="bg1"/>
+                </a:solidFill>
+                <a:effectLst/>
+                <a:latin typeface="arial" panose="020B0604020202020204" pitchFamily="34" charset="0"/>
+              </a:rPr>
+              <a:t>®</a:t>
+            </a:r>
+            <a:endParaRPr lang="en-US" sz="2400" b="1" dirty="0">
+              <a:solidFill>
+                <a:schemeClr val="bg1"/>
+              </a:solidFill>
+              <a:latin typeface="Arial Black" panose="020B0A04020102020204" pitchFamily="34" charset="0"/>
+            </a:endParaRPr>
+          </a:p>
+        </p:txBody>
+      </p:sp>
+      <p:sp>
+        <p:nvSpPr>
+          <p:cNvPr id="13" name="Scroll: Vertical 12">
+            <a:extLst>
+              <a:ext uri="{FF2B5EF4-FFF2-40B4-BE49-F238E27FC236}">
+                <a16:creationId xmlns:a16="http://schemas.microsoft.com/office/drawing/2014/main" id="{BB80B18F-2B14-894E-57C6-EC163F824025}"/>
+              </a:ext>
+            </a:extLst>
+          </p:cNvPr>
+          <p:cNvSpPr/>
+          <p:nvPr/>
+        </p:nvSpPr>
+        <p:spPr>
+          <a:xfrm>
+            <a:off x="10459839" y="887102"/>
+            <a:ext cx="1091821" cy="873457"/>
+          </a:xfrm>
+          <a:prstGeom prst="verticalScroll">
+            <a:avLst/>
+          </a:prstGeom>
+          <a:solidFill>
+            <a:schemeClr val="bg1"/>
+          </a:solidFill>
+        </p:spPr>
+        <p:style>
+          <a:lnRef idx="2">
+            <a:schemeClr val="accent1">
+              <a:shade val="15000"/>
+            </a:schemeClr>
+          </a:lnRef>
+          <a:fillRef idx="1">
+            <a:schemeClr val="accent1"/>
+          </a:fillRef>
+          <a:effectRef idx="0">
+            <a:schemeClr val="accent1"/>
+          </a:effectRef>
+          <a:fontRef idx="minor">
+            <a:schemeClr val="lt1"/>
+          </a:fontRef>
+        </p:style>
+        <p:txBody>
+          <a:bodyPr rtlCol="0" anchor="ctr"/>
+          <a:lstStyle/>
+          <a:p>
+            <a:pPr algn="ctr"/>
+            <a:r>
+              <a:rPr lang="en-US" sz="4400" b="1" dirty="0">
+                <a:solidFill>
+                  <a:schemeClr val="tx1"/>
+                </a:solidFill>
+              </a:rPr>
+              <a:t>3</a:t>
+            </a:r>
+          </a:p>
+        </p:txBody>
+      </p:sp>
+      <p:sp>
+        <p:nvSpPr>
+          <p:cNvPr id="14" name="TextBox 13">
+            <a:extLst>
+              <a:ext uri="{FF2B5EF4-FFF2-40B4-BE49-F238E27FC236}">
+                <a16:creationId xmlns:a16="http://schemas.microsoft.com/office/drawing/2014/main" id="{5E9C113D-AE55-F3B3-E221-1D8CA4D0EC80}"/>
+              </a:ext>
+            </a:extLst>
+          </p:cNvPr>
+          <p:cNvSpPr txBox="1"/>
+          <p:nvPr/>
+        </p:nvSpPr>
+        <p:spPr>
+          <a:xfrm>
+            <a:off x="1109533" y="259307"/>
+            <a:ext cx="4093941" cy="707886"/>
+          </a:xfrm>
+          <a:prstGeom prst="rect">
+            <a:avLst/>
+          </a:prstGeom>
+          <a:noFill/>
+        </p:spPr>
+        <p:txBody>
+          <a:bodyPr wrap="none" rtlCol="0">
+            <a:spAutoFit/>
+          </a:bodyPr>
+          <a:lstStyle/>
+          <a:p>
+            <a:r>
+              <a:rPr lang="en-US" sz="4000" b="1" dirty="0">
+                <a:latin typeface="Arial Black" panose="020B0A04020102020204" pitchFamily="34" charset="0"/>
+              </a:rPr>
+              <a:t>Week #11,#12</a:t>
+            </a:r>
+          </a:p>
+        </p:txBody>
+      </p:sp>
+      <p:pic>
+        <p:nvPicPr>
+          <p:cNvPr id="3" name="Picture 2">
+            <a:extLst>
+              <a:ext uri="{FF2B5EF4-FFF2-40B4-BE49-F238E27FC236}">
+                <a16:creationId xmlns:a16="http://schemas.microsoft.com/office/drawing/2014/main" id="{DBCC60DA-9DC1-6616-B863-295E5CC38F69}"/>
+              </a:ext>
+            </a:extLst>
+          </p:cNvPr>
+          <p:cNvPicPr>
+            <a:picLocks noChangeAspect="1"/>
+          </p:cNvPicPr>
+          <p:nvPr/>
+        </p:nvPicPr>
+        <p:blipFill>
+          <a:blip r:embed="rId3">
+            <a:extLst>
+              <a:ext uri="{28A0092B-C50C-407E-A947-70E740481C1C}">
+                <a14:useLocalDpi xmlns:a14="http://schemas.microsoft.com/office/drawing/2010/main" val="0"/>
+              </a:ext>
+            </a:extLst>
+          </a:blip>
+          <a:stretch>
+            <a:fillRect/>
+          </a:stretch>
+        </p:blipFill>
+        <p:spPr>
+          <a:xfrm>
+            <a:off x="1500626" y="1009397"/>
+            <a:ext cx="4792399" cy="538050"/>
+          </a:xfrm>
+          <a:prstGeom prst="rect">
+            <a:avLst/>
+          </a:prstGeom>
+        </p:spPr>
+      </p:pic>
+      <p:pic>
+        <p:nvPicPr>
+          <p:cNvPr id="4" name="Picture 3">
+            <a:extLst>
+              <a:ext uri="{FF2B5EF4-FFF2-40B4-BE49-F238E27FC236}">
+                <a16:creationId xmlns:a16="http://schemas.microsoft.com/office/drawing/2014/main" id="{7D56694E-E41F-1057-96B3-B7AE87666704}"/>
+              </a:ext>
+            </a:extLst>
+          </p:cNvPr>
+          <p:cNvPicPr>
+            <a:picLocks noChangeAspect="1"/>
+          </p:cNvPicPr>
+          <p:nvPr/>
+        </p:nvPicPr>
+        <p:blipFill>
+          <a:blip r:embed="rId4">
+            <a:extLst>
+              <a:ext uri="{28A0092B-C50C-407E-A947-70E740481C1C}">
+                <a14:useLocalDpi xmlns:a14="http://schemas.microsoft.com/office/drawing/2010/main" val="0"/>
+              </a:ext>
+            </a:extLst>
+          </a:blip>
+          <a:stretch>
+            <a:fillRect/>
+          </a:stretch>
+        </p:blipFill>
+        <p:spPr>
+          <a:xfrm>
+            <a:off x="1915235" y="1653836"/>
+            <a:ext cx="7366229" cy="3852265"/>
+          </a:xfrm>
+          <a:prstGeom prst="rect">
+            <a:avLst/>
+          </a:prstGeom>
+        </p:spPr>
+      </p:pic>
+    </p:spTree>
+    <p:extLst>
+      <p:ext uri="{BB962C8B-B14F-4D97-AF65-F5344CB8AC3E}">
+        <p14:creationId xmlns:p14="http://schemas.microsoft.com/office/powerpoint/2010/main" val="3698383698"/>
+      </p:ext>
+    </p:extLst>
+  </p:cSld>
+  <p:clrMapOvr>
+    <a:masterClrMapping/>
+  </p:clrMapOvr>
+</p:sld>
+</file>
+
+<file path=ppt/slides/slide4.xml><?xml version="1.0" encoding="utf-8"?>
+<p:sld xmlns:a="http://schemas.openxmlformats.org/drawingml/2006/main" xmlns:r="http://schemas.openxmlformats.org/officeDocument/2006/relationships" xmlns:p="http://schemas.openxmlformats.org/presentationml/2006/main">
+  <p:cSld>
+    <p:spTree>
+      <p:nvGrpSpPr>
+        <p:cNvPr id="1" name=""/>
+        <p:cNvGrpSpPr/>
+        <p:nvPr/>
+      </p:nvGrpSpPr>
+      <p:grpSpPr>
+        <a:xfrm>
+          <a:off x="0" y="0"/>
+          <a:ext cx="0" cy="0"/>
+          <a:chOff x="0" y="0"/>
+          <a:chExt cx="0" cy="0"/>
+        </a:xfrm>
+      </p:grpSpPr>
+      <p:pic>
+        <p:nvPicPr>
+          <p:cNvPr id="7" name="Picture 6">
+            <a:extLst>
+              <a:ext uri="{FF2B5EF4-FFF2-40B4-BE49-F238E27FC236}">
+                <a16:creationId xmlns:a16="http://schemas.microsoft.com/office/drawing/2014/main" id="{AD277A71-C5A3-2B53-25AA-A52C92EF6CC4}"/>
+              </a:ext>
+            </a:extLst>
+          </p:cNvPr>
+          <p:cNvPicPr>
+            <a:picLocks noChangeAspect="1"/>
+          </p:cNvPicPr>
+          <p:nvPr/>
+        </p:nvPicPr>
+        <p:blipFill>
+          <a:blip r:embed="rId2">
+            <a:extLst>
+              <a:ext uri="{28A0092B-C50C-407E-A947-70E740481C1C}">
+                <a14:useLocalDpi xmlns:a14="http://schemas.microsoft.com/office/drawing/2010/main" val="0"/>
+              </a:ext>
+            </a:extLst>
+          </a:blip>
+          <a:stretch>
+            <a:fillRect/>
+          </a:stretch>
+        </p:blipFill>
+        <p:spPr>
+          <a:xfrm>
+            <a:off x="0" y="4844958"/>
+            <a:ext cx="1915235" cy="1915235"/>
+          </a:xfrm>
+          <a:prstGeom prst="rect">
+            <a:avLst/>
+          </a:prstGeom>
+        </p:spPr>
+      </p:pic>
+      <p:sp>
+        <p:nvSpPr>
+          <p:cNvPr id="8" name="TextBox 7">
+            <a:extLst>
+              <a:ext uri="{FF2B5EF4-FFF2-40B4-BE49-F238E27FC236}">
+                <a16:creationId xmlns:a16="http://schemas.microsoft.com/office/drawing/2014/main" id="{0835D244-D79F-8F6B-3481-116553499408}"/>
+              </a:ext>
+            </a:extLst>
+          </p:cNvPr>
+          <p:cNvSpPr txBox="1"/>
+          <p:nvPr/>
+        </p:nvSpPr>
+        <p:spPr>
+          <a:xfrm>
+            <a:off x="9778558" y="259307"/>
+            <a:ext cx="2536272" cy="461665"/>
+          </a:xfrm>
+          <a:prstGeom prst="rect">
+            <a:avLst/>
+          </a:prstGeom>
+          <a:noFill/>
+        </p:spPr>
+        <p:txBody>
+          <a:bodyPr wrap="square" rtlCol="0">
+            <a:spAutoFit/>
+          </a:bodyPr>
+          <a:lstStyle/>
+          <a:p>
+            <a:r>
+              <a:rPr lang="en-US" sz="2400" b="1" dirty="0">
+                <a:solidFill>
+                  <a:schemeClr val="bg1"/>
+                </a:solidFill>
+                <a:latin typeface="Arial Black" panose="020B0A04020102020204" pitchFamily="34" charset="0"/>
+              </a:rPr>
+              <a:t>AI Academy</a:t>
+            </a:r>
+            <a:r>
+              <a:rPr lang="en-US" sz="2400" b="0" i="0" dirty="0">
+                <a:solidFill>
+                  <a:schemeClr val="bg1"/>
+                </a:solidFill>
+                <a:effectLst/>
+                <a:latin typeface="arial" panose="020B0604020202020204" pitchFamily="34" charset="0"/>
+              </a:rPr>
+              <a:t>®</a:t>
+            </a:r>
+            <a:endParaRPr lang="en-US" sz="2400" b="1" dirty="0">
+              <a:solidFill>
+                <a:schemeClr val="bg1"/>
+              </a:solidFill>
+              <a:latin typeface="Arial Black" panose="020B0A04020102020204" pitchFamily="34" charset="0"/>
+            </a:endParaRPr>
+          </a:p>
+        </p:txBody>
+      </p:sp>
+      <p:sp>
+        <p:nvSpPr>
+          <p:cNvPr id="13" name="Scroll: Vertical 12">
+            <a:extLst>
+              <a:ext uri="{FF2B5EF4-FFF2-40B4-BE49-F238E27FC236}">
+                <a16:creationId xmlns:a16="http://schemas.microsoft.com/office/drawing/2014/main" id="{BB80B18F-2B14-894E-57C6-EC163F824025}"/>
+              </a:ext>
+            </a:extLst>
+          </p:cNvPr>
+          <p:cNvSpPr/>
+          <p:nvPr/>
+        </p:nvSpPr>
+        <p:spPr>
+          <a:xfrm>
+            <a:off x="10459839" y="887102"/>
+            <a:ext cx="1091821" cy="873457"/>
+          </a:xfrm>
+          <a:prstGeom prst="verticalScroll">
+            <a:avLst/>
+          </a:prstGeom>
+          <a:solidFill>
+            <a:schemeClr val="bg1"/>
+          </a:solidFill>
+        </p:spPr>
+        <p:style>
+          <a:lnRef idx="2">
+            <a:schemeClr val="accent1">
+              <a:shade val="15000"/>
+            </a:schemeClr>
+          </a:lnRef>
+          <a:fillRef idx="1">
+            <a:schemeClr val="accent1"/>
+          </a:fillRef>
+          <a:effectRef idx="0">
+            <a:schemeClr val="accent1"/>
+          </a:effectRef>
+          <a:fontRef idx="minor">
+            <a:schemeClr val="lt1"/>
+          </a:fontRef>
+        </p:style>
+        <p:txBody>
+          <a:bodyPr rtlCol="0" anchor="ctr"/>
+          <a:lstStyle/>
+          <a:p>
+            <a:pPr algn="ctr"/>
+            <a:r>
+              <a:rPr lang="en-US" sz="4400" b="1" dirty="0">
+                <a:solidFill>
+                  <a:schemeClr val="tx1"/>
+                </a:solidFill>
+              </a:rPr>
+              <a:t>4</a:t>
+            </a:r>
+          </a:p>
+        </p:txBody>
+      </p:sp>
+      <p:sp>
+        <p:nvSpPr>
+          <p:cNvPr id="14" name="TextBox 13">
+            <a:extLst>
+              <a:ext uri="{FF2B5EF4-FFF2-40B4-BE49-F238E27FC236}">
+                <a16:creationId xmlns:a16="http://schemas.microsoft.com/office/drawing/2014/main" id="{5E9C113D-AE55-F3B3-E221-1D8CA4D0EC80}"/>
+              </a:ext>
+            </a:extLst>
+          </p:cNvPr>
+          <p:cNvSpPr txBox="1"/>
+          <p:nvPr/>
+        </p:nvSpPr>
+        <p:spPr>
+          <a:xfrm>
+            <a:off x="1109533" y="259307"/>
+            <a:ext cx="4093941" cy="707886"/>
+          </a:xfrm>
+          <a:prstGeom prst="rect">
+            <a:avLst/>
+          </a:prstGeom>
+          <a:noFill/>
+        </p:spPr>
+        <p:txBody>
+          <a:bodyPr wrap="none" rtlCol="0">
+            <a:spAutoFit/>
+          </a:bodyPr>
+          <a:lstStyle/>
+          <a:p>
+            <a:r>
+              <a:rPr lang="en-US" sz="4000" b="1" dirty="0">
+                <a:latin typeface="Arial Black" panose="020B0A04020102020204" pitchFamily="34" charset="0"/>
+              </a:rPr>
+              <a:t>Week #11,#12</a:t>
+            </a:r>
+          </a:p>
+        </p:txBody>
+      </p:sp>
+      <p:pic>
+        <p:nvPicPr>
+          <p:cNvPr id="3" name="Picture 2">
+            <a:extLst>
+              <a:ext uri="{FF2B5EF4-FFF2-40B4-BE49-F238E27FC236}">
+                <a16:creationId xmlns:a16="http://schemas.microsoft.com/office/drawing/2014/main" id="{DBCC60DA-9DC1-6616-B863-295E5CC38F69}"/>
+              </a:ext>
+            </a:extLst>
+          </p:cNvPr>
+          <p:cNvPicPr>
+            <a:picLocks noChangeAspect="1"/>
+          </p:cNvPicPr>
+          <p:nvPr/>
+        </p:nvPicPr>
+        <p:blipFill>
+          <a:blip r:embed="rId3">
+            <a:extLst>
+              <a:ext uri="{28A0092B-C50C-407E-A947-70E740481C1C}">
+                <a14:useLocalDpi xmlns:a14="http://schemas.microsoft.com/office/drawing/2010/main" val="0"/>
+              </a:ext>
+            </a:extLst>
+          </a:blip>
+          <a:stretch>
+            <a:fillRect/>
+          </a:stretch>
+        </p:blipFill>
+        <p:spPr>
+          <a:xfrm>
+            <a:off x="1500626" y="1009397"/>
+            <a:ext cx="4792399" cy="538050"/>
+          </a:xfrm>
+          <a:prstGeom prst="rect">
+            <a:avLst/>
+          </a:prstGeom>
+        </p:spPr>
+      </p:pic>
+      <p:pic>
+        <p:nvPicPr>
+          <p:cNvPr id="5" name="Picture 4">
+            <a:extLst>
+              <a:ext uri="{FF2B5EF4-FFF2-40B4-BE49-F238E27FC236}">
+                <a16:creationId xmlns:a16="http://schemas.microsoft.com/office/drawing/2014/main" id="{C5981D10-DC81-60C1-2D09-844E3DBD8993}"/>
+              </a:ext>
+            </a:extLst>
+          </p:cNvPr>
+          <p:cNvPicPr>
+            <a:picLocks noChangeAspect="1"/>
+          </p:cNvPicPr>
+          <p:nvPr/>
+        </p:nvPicPr>
+        <p:blipFill>
+          <a:blip r:embed="rId4">
+            <a:extLst>
+              <a:ext uri="{28A0092B-C50C-407E-A947-70E740481C1C}">
+                <a14:useLocalDpi xmlns:a14="http://schemas.microsoft.com/office/drawing/2010/main" val="0"/>
+              </a:ext>
+            </a:extLst>
+          </a:blip>
+          <a:stretch>
+            <a:fillRect/>
+          </a:stretch>
+        </p:blipFill>
+        <p:spPr>
+          <a:xfrm>
+            <a:off x="1603790" y="1589651"/>
+            <a:ext cx="6772642" cy="3902878"/>
+          </a:xfrm>
+          <a:prstGeom prst="rect">
+            <a:avLst/>
+          </a:prstGeom>
+        </p:spPr>
+      </p:pic>
+      <p:pic>
+        <p:nvPicPr>
+          <p:cNvPr id="9" name="Picture 8">
+            <a:extLst>
+              <a:ext uri="{FF2B5EF4-FFF2-40B4-BE49-F238E27FC236}">
+                <a16:creationId xmlns:a16="http://schemas.microsoft.com/office/drawing/2014/main" id="{C824E1B5-A603-03D7-7D75-84C6716BC712}"/>
+              </a:ext>
+            </a:extLst>
+          </p:cNvPr>
+          <p:cNvPicPr>
+            <a:picLocks noChangeAspect="1"/>
+          </p:cNvPicPr>
+          <p:nvPr/>
+        </p:nvPicPr>
+        <p:blipFill>
+          <a:blip r:embed="rId5">
+            <a:extLst>
+              <a:ext uri="{28A0092B-C50C-407E-A947-70E740481C1C}">
+                <a14:useLocalDpi xmlns:a14="http://schemas.microsoft.com/office/drawing/2010/main" val="0"/>
+              </a:ext>
+            </a:extLst>
+          </a:blip>
+          <a:stretch>
+            <a:fillRect/>
+          </a:stretch>
+        </p:blipFill>
+        <p:spPr>
+          <a:xfrm>
+            <a:off x="2612267" y="3171483"/>
+            <a:ext cx="4085130" cy="739214"/>
+          </a:xfrm>
+          <a:prstGeom prst="rect">
+            <a:avLst/>
+          </a:prstGeom>
+        </p:spPr>
+      </p:pic>
+      <p:pic>
+        <p:nvPicPr>
+          <p:cNvPr id="11" name="Picture 10">
+            <a:extLst>
+              <a:ext uri="{FF2B5EF4-FFF2-40B4-BE49-F238E27FC236}">
+                <a16:creationId xmlns:a16="http://schemas.microsoft.com/office/drawing/2014/main" id="{5B192C2D-8D67-A012-192F-7A5C88A2F0A1}"/>
+              </a:ext>
+            </a:extLst>
+          </p:cNvPr>
+          <p:cNvPicPr>
+            <a:picLocks noChangeAspect="1"/>
+          </p:cNvPicPr>
+          <p:nvPr/>
+        </p:nvPicPr>
+        <p:blipFill>
+          <a:blip r:embed="rId6">
+            <a:extLst>
+              <a:ext uri="{28A0092B-C50C-407E-A947-70E740481C1C}">
+                <a14:useLocalDpi xmlns:a14="http://schemas.microsoft.com/office/drawing/2010/main" val="0"/>
+              </a:ext>
+            </a:extLst>
+          </a:blip>
+          <a:stretch>
+            <a:fillRect/>
+          </a:stretch>
+        </p:blipFill>
+        <p:spPr>
+          <a:xfrm>
+            <a:off x="2114223" y="5436257"/>
+            <a:ext cx="6949959" cy="580192"/>
+          </a:xfrm>
+          <a:prstGeom prst="rect">
+            <a:avLst/>
+          </a:prstGeom>
+        </p:spPr>
+      </p:pic>
+    </p:spTree>
+    <p:extLst>
+      <p:ext uri="{BB962C8B-B14F-4D97-AF65-F5344CB8AC3E}">
+        <p14:creationId xmlns:p14="http://schemas.microsoft.com/office/powerpoint/2010/main" val="3816617761"/>
+      </p:ext>
+    </p:extLst>
+  </p:cSld>
+  <p:clrMapOvr>
+    <a:masterClrMapping/>
+  </p:clrMapOvr>
+</p:sld>
+</file>
+
+<file path=ppt/slides/slide5.xml><?xml version="1.0" encoding="utf-8"?>
+<p:sld xmlns:a="http://schemas.openxmlformats.org/drawingml/2006/main" xmlns:r="http://schemas.openxmlformats.org/officeDocument/2006/relationships" xmlns:p="http://schemas.openxmlformats.org/presentationml/2006/main">
+  <p:cSld>
+    <p:spTree>
+      <p:nvGrpSpPr>
+        <p:cNvPr id="1" name=""/>
+        <p:cNvGrpSpPr/>
+        <p:nvPr/>
+      </p:nvGrpSpPr>
+      <p:grpSpPr>
+        <a:xfrm>
+          <a:off x="0" y="0"/>
+          <a:ext cx="0" cy="0"/>
+          <a:chOff x="0" y="0"/>
+          <a:chExt cx="0" cy="0"/>
+        </a:xfrm>
+      </p:grpSpPr>
+      <p:pic>
+        <p:nvPicPr>
+          <p:cNvPr id="7" name="Picture 6">
+            <a:extLst>
+              <a:ext uri="{FF2B5EF4-FFF2-40B4-BE49-F238E27FC236}">
+                <a16:creationId xmlns:a16="http://schemas.microsoft.com/office/drawing/2014/main" id="{AD277A71-C5A3-2B53-25AA-A52C92EF6CC4}"/>
+              </a:ext>
+            </a:extLst>
+          </p:cNvPr>
+          <p:cNvPicPr>
+            <a:picLocks noChangeAspect="1"/>
+          </p:cNvPicPr>
+          <p:nvPr/>
+        </p:nvPicPr>
+        <p:blipFill>
+          <a:blip r:embed="rId2">
+            <a:extLst>
+              <a:ext uri="{28A0092B-C50C-407E-A947-70E740481C1C}">
+                <a14:useLocalDpi xmlns:a14="http://schemas.microsoft.com/office/drawing/2010/main" val="0"/>
+              </a:ext>
+            </a:extLst>
+          </a:blip>
+          <a:stretch>
+            <a:fillRect/>
+          </a:stretch>
+        </p:blipFill>
+        <p:spPr>
+          <a:xfrm>
+            <a:off x="0" y="4844958"/>
+            <a:ext cx="1915235" cy="1915235"/>
+          </a:xfrm>
+          <a:prstGeom prst="rect">
+            <a:avLst/>
+          </a:prstGeom>
+        </p:spPr>
+      </p:pic>
+      <p:sp>
+        <p:nvSpPr>
+          <p:cNvPr id="8" name="TextBox 7">
+            <a:extLst>
+              <a:ext uri="{FF2B5EF4-FFF2-40B4-BE49-F238E27FC236}">
+                <a16:creationId xmlns:a16="http://schemas.microsoft.com/office/drawing/2014/main" id="{0835D244-D79F-8F6B-3481-116553499408}"/>
+              </a:ext>
+            </a:extLst>
+          </p:cNvPr>
+          <p:cNvSpPr txBox="1"/>
+          <p:nvPr/>
+        </p:nvSpPr>
+        <p:spPr>
+          <a:xfrm>
+            <a:off x="9778558" y="259307"/>
+            <a:ext cx="2536272" cy="461665"/>
+          </a:xfrm>
+          <a:prstGeom prst="rect">
+            <a:avLst/>
+          </a:prstGeom>
+          <a:noFill/>
+        </p:spPr>
+        <p:txBody>
+          <a:bodyPr wrap="square" rtlCol="0">
+            <a:spAutoFit/>
+          </a:bodyPr>
+          <a:lstStyle/>
+          <a:p>
+            <a:r>
+              <a:rPr lang="en-US" sz="2400" b="1" dirty="0">
+                <a:solidFill>
+                  <a:schemeClr val="bg1"/>
+                </a:solidFill>
+                <a:latin typeface="Arial Black" panose="020B0A04020102020204" pitchFamily="34" charset="0"/>
+              </a:rPr>
+              <a:t>AI Academy</a:t>
+            </a:r>
+            <a:r>
+              <a:rPr lang="en-US" sz="2400" b="0" i="0" dirty="0">
+                <a:solidFill>
+                  <a:schemeClr val="bg1"/>
+                </a:solidFill>
+                <a:effectLst/>
+                <a:latin typeface="arial" panose="020B0604020202020204" pitchFamily="34" charset="0"/>
+              </a:rPr>
+              <a:t>®</a:t>
+            </a:r>
+            <a:endParaRPr lang="en-US" sz="2400" b="1" dirty="0">
+              <a:solidFill>
+                <a:schemeClr val="bg1"/>
+              </a:solidFill>
+              <a:latin typeface="Arial Black" panose="020B0A04020102020204" pitchFamily="34" charset="0"/>
+            </a:endParaRPr>
+          </a:p>
+        </p:txBody>
+      </p:sp>
+      <p:sp>
+        <p:nvSpPr>
+          <p:cNvPr id="13" name="Scroll: Vertical 12">
+            <a:extLst>
+              <a:ext uri="{FF2B5EF4-FFF2-40B4-BE49-F238E27FC236}">
+                <a16:creationId xmlns:a16="http://schemas.microsoft.com/office/drawing/2014/main" id="{BB80B18F-2B14-894E-57C6-EC163F824025}"/>
+              </a:ext>
+            </a:extLst>
+          </p:cNvPr>
+          <p:cNvSpPr/>
+          <p:nvPr/>
+        </p:nvSpPr>
+        <p:spPr>
+          <a:xfrm>
+            <a:off x="10459839" y="887102"/>
+            <a:ext cx="1091821" cy="873457"/>
+          </a:xfrm>
+          <a:prstGeom prst="verticalScroll">
+            <a:avLst/>
+          </a:prstGeom>
+          <a:solidFill>
+            <a:schemeClr val="bg1"/>
+          </a:solidFill>
+        </p:spPr>
+        <p:style>
+          <a:lnRef idx="2">
+            <a:schemeClr val="accent1">
+              <a:shade val="15000"/>
+            </a:schemeClr>
+          </a:lnRef>
+          <a:fillRef idx="1">
+            <a:schemeClr val="accent1"/>
+          </a:fillRef>
+          <a:effectRef idx="0">
+            <a:schemeClr val="accent1"/>
+          </a:effectRef>
+          <a:fontRef idx="minor">
+            <a:schemeClr val="lt1"/>
+          </a:fontRef>
+        </p:style>
+        <p:txBody>
+          <a:bodyPr rtlCol="0" anchor="ctr"/>
+          <a:lstStyle/>
+          <a:p>
+            <a:pPr algn="ctr"/>
+            <a:r>
+              <a:rPr lang="en-US" sz="4400" b="1" dirty="0">
+                <a:solidFill>
+                  <a:schemeClr val="tx1"/>
+                </a:solidFill>
+              </a:rPr>
+              <a:t>5</a:t>
+            </a:r>
+          </a:p>
+        </p:txBody>
+      </p:sp>
+      <p:sp>
+        <p:nvSpPr>
+          <p:cNvPr id="14" name="TextBox 13">
+            <a:extLst>
+              <a:ext uri="{FF2B5EF4-FFF2-40B4-BE49-F238E27FC236}">
+                <a16:creationId xmlns:a16="http://schemas.microsoft.com/office/drawing/2014/main" id="{5E9C113D-AE55-F3B3-E221-1D8CA4D0EC80}"/>
+              </a:ext>
+            </a:extLst>
+          </p:cNvPr>
+          <p:cNvSpPr txBox="1"/>
+          <p:nvPr/>
+        </p:nvSpPr>
+        <p:spPr>
+          <a:xfrm>
+            <a:off x="1109533" y="259307"/>
+            <a:ext cx="4093941" cy="707886"/>
+          </a:xfrm>
+          <a:prstGeom prst="rect">
+            <a:avLst/>
+          </a:prstGeom>
+          <a:noFill/>
+        </p:spPr>
+        <p:txBody>
+          <a:bodyPr wrap="none" rtlCol="0">
+            <a:spAutoFit/>
+          </a:bodyPr>
+          <a:lstStyle/>
+          <a:p>
+            <a:r>
+              <a:rPr lang="en-US" sz="4000" b="1" dirty="0">
+                <a:latin typeface="Arial Black" panose="020B0A04020102020204" pitchFamily="34" charset="0"/>
+              </a:rPr>
+              <a:t>Week #11,#12</a:t>
+            </a:r>
+          </a:p>
+        </p:txBody>
+      </p:sp>
+      <p:pic>
+        <p:nvPicPr>
+          <p:cNvPr id="3" name="Picture 2">
+            <a:extLst>
+              <a:ext uri="{FF2B5EF4-FFF2-40B4-BE49-F238E27FC236}">
+                <a16:creationId xmlns:a16="http://schemas.microsoft.com/office/drawing/2014/main" id="{DBCC60DA-9DC1-6616-B863-295E5CC38F69}"/>
+              </a:ext>
+            </a:extLst>
+          </p:cNvPr>
+          <p:cNvPicPr>
+            <a:picLocks noChangeAspect="1"/>
+          </p:cNvPicPr>
+          <p:nvPr/>
+        </p:nvPicPr>
+        <p:blipFill>
+          <a:blip r:embed="rId3">
+            <a:extLst>
+              <a:ext uri="{28A0092B-C50C-407E-A947-70E740481C1C}">
+                <a14:useLocalDpi xmlns:a14="http://schemas.microsoft.com/office/drawing/2010/main" val="0"/>
+              </a:ext>
+            </a:extLst>
+          </a:blip>
+          <a:stretch>
+            <a:fillRect/>
+          </a:stretch>
+        </p:blipFill>
+        <p:spPr>
+          <a:xfrm>
+            <a:off x="1500626" y="1009397"/>
+            <a:ext cx="4792399" cy="538050"/>
+          </a:xfrm>
+          <a:prstGeom prst="rect">
+            <a:avLst/>
+          </a:prstGeom>
+        </p:spPr>
+      </p:pic>
+      <p:pic>
+        <p:nvPicPr>
+          <p:cNvPr id="5" name="Picture 4">
+            <a:extLst>
+              <a:ext uri="{FF2B5EF4-FFF2-40B4-BE49-F238E27FC236}">
+                <a16:creationId xmlns:a16="http://schemas.microsoft.com/office/drawing/2014/main" id="{B5E97EF0-D13F-0541-13C2-464FD52F0157}"/>
+              </a:ext>
+            </a:extLst>
+          </p:cNvPr>
+          <p:cNvPicPr>
+            <a:picLocks noChangeAspect="1"/>
+          </p:cNvPicPr>
+          <p:nvPr/>
+        </p:nvPicPr>
+        <p:blipFill>
+          <a:blip r:embed="rId4">
+            <a:extLst>
+              <a:ext uri="{28A0092B-C50C-407E-A947-70E740481C1C}">
+                <a14:useLocalDpi xmlns:a14="http://schemas.microsoft.com/office/drawing/2010/main" val="0"/>
+              </a:ext>
+            </a:extLst>
+          </a:blip>
+          <a:stretch>
+            <a:fillRect/>
+          </a:stretch>
+        </p:blipFill>
+        <p:spPr>
+          <a:xfrm>
+            <a:off x="1581601" y="1203575"/>
+            <a:ext cx="7552322" cy="5654425"/>
+          </a:xfrm>
+          <a:prstGeom prst="rect">
+            <a:avLst/>
+          </a:prstGeom>
+        </p:spPr>
+      </p:pic>
+    </p:spTree>
+    <p:extLst>
+      <p:ext uri="{BB962C8B-B14F-4D97-AF65-F5344CB8AC3E}">
+        <p14:creationId xmlns:p14="http://schemas.microsoft.com/office/powerpoint/2010/main" val="1250533932"/>
+      </p:ext>
+    </p:extLst>
+  </p:cSld>
+  <p:clrMapOvr>
+    <a:masterClrMapping/>
+  </p:clrMapOvr>
+</p:sld>
+</file>
+
+<file path=ppt/slides/slide6.xml><?xml version="1.0" encoding="utf-8"?>
+<p:sld xmlns:a="http://schemas.openxmlformats.org/drawingml/2006/main" xmlns:r="http://schemas.openxmlformats.org/officeDocument/2006/relationships" xmlns:p="http://schemas.openxmlformats.org/presentationml/2006/main">
+  <p:cSld>
+    <p:spTree>
+      <p:nvGrpSpPr>
+        <p:cNvPr id="1" name=""/>
+        <p:cNvGrpSpPr/>
+        <p:nvPr/>
+      </p:nvGrpSpPr>
+      <p:grpSpPr>
+        <a:xfrm>
+          <a:off x="0" y="0"/>
+          <a:ext cx="0" cy="0"/>
+          <a:chOff x="0" y="0"/>
+          <a:chExt cx="0" cy="0"/>
+        </a:xfrm>
+      </p:grpSpPr>
+      <p:pic>
+        <p:nvPicPr>
+          <p:cNvPr id="7" name="Picture 6">
+            <a:extLst>
+              <a:ext uri="{FF2B5EF4-FFF2-40B4-BE49-F238E27FC236}">
+                <a16:creationId xmlns:a16="http://schemas.microsoft.com/office/drawing/2014/main" id="{AD277A71-C5A3-2B53-25AA-A52C92EF6CC4}"/>
+              </a:ext>
+            </a:extLst>
+          </p:cNvPr>
+          <p:cNvPicPr>
+            <a:picLocks noChangeAspect="1"/>
+          </p:cNvPicPr>
+          <p:nvPr/>
+        </p:nvPicPr>
+        <p:blipFill>
+          <a:blip r:embed="rId2">
+            <a:extLst>
+              <a:ext uri="{28A0092B-C50C-407E-A947-70E740481C1C}">
+                <a14:useLocalDpi xmlns:a14="http://schemas.microsoft.com/office/drawing/2010/main" val="0"/>
+              </a:ext>
+            </a:extLst>
+          </a:blip>
+          <a:stretch>
+            <a:fillRect/>
+          </a:stretch>
+        </p:blipFill>
+        <p:spPr>
+          <a:xfrm>
+            <a:off x="0" y="4844958"/>
+            <a:ext cx="1915235" cy="1915235"/>
+          </a:xfrm>
+          <a:prstGeom prst="rect">
+            <a:avLst/>
+          </a:prstGeom>
+        </p:spPr>
+      </p:pic>
+      <p:sp>
+        <p:nvSpPr>
+          <p:cNvPr id="8" name="TextBox 7">
+            <a:extLst>
+              <a:ext uri="{FF2B5EF4-FFF2-40B4-BE49-F238E27FC236}">
+                <a16:creationId xmlns:a16="http://schemas.microsoft.com/office/drawing/2014/main" id="{0835D244-D79F-8F6B-3481-116553499408}"/>
+              </a:ext>
+            </a:extLst>
+          </p:cNvPr>
+          <p:cNvSpPr txBox="1"/>
+          <p:nvPr/>
+        </p:nvSpPr>
+        <p:spPr>
+          <a:xfrm>
+            <a:off x="9778558" y="259307"/>
+            <a:ext cx="2536272" cy="461665"/>
+          </a:xfrm>
+          <a:prstGeom prst="rect">
+            <a:avLst/>
+          </a:prstGeom>
+          <a:noFill/>
+        </p:spPr>
+        <p:txBody>
+          <a:bodyPr wrap="square" rtlCol="0">
+            <a:spAutoFit/>
+          </a:bodyPr>
+          <a:lstStyle/>
+          <a:p>
+            <a:r>
+              <a:rPr lang="en-US" sz="2400" b="1" dirty="0">
+                <a:solidFill>
+                  <a:schemeClr val="bg1"/>
+                </a:solidFill>
+                <a:latin typeface="Arial Black" panose="020B0A04020102020204" pitchFamily="34" charset="0"/>
+              </a:rPr>
+              <a:t>AI Academy</a:t>
+            </a:r>
+            <a:r>
+              <a:rPr lang="en-US" sz="2400" b="0" i="0" dirty="0">
+                <a:solidFill>
+                  <a:schemeClr val="bg1"/>
+                </a:solidFill>
+                <a:effectLst/>
+                <a:latin typeface="arial" panose="020B0604020202020204" pitchFamily="34" charset="0"/>
+              </a:rPr>
+              <a:t>®</a:t>
+            </a:r>
+            <a:endParaRPr lang="en-US" sz="2400" b="1" dirty="0">
+              <a:solidFill>
+                <a:schemeClr val="bg1"/>
+              </a:solidFill>
+              <a:latin typeface="Arial Black" panose="020B0A04020102020204" pitchFamily="34" charset="0"/>
+            </a:endParaRPr>
+          </a:p>
+        </p:txBody>
+      </p:sp>
+      <p:sp>
+        <p:nvSpPr>
+          <p:cNvPr id="13" name="Scroll: Vertical 12">
+            <a:extLst>
+              <a:ext uri="{FF2B5EF4-FFF2-40B4-BE49-F238E27FC236}">
+                <a16:creationId xmlns:a16="http://schemas.microsoft.com/office/drawing/2014/main" id="{BB80B18F-2B14-894E-57C6-EC163F824025}"/>
+              </a:ext>
+            </a:extLst>
+          </p:cNvPr>
+          <p:cNvSpPr/>
+          <p:nvPr/>
+        </p:nvSpPr>
+        <p:spPr>
+          <a:xfrm>
+            <a:off x="10459839" y="887102"/>
+            <a:ext cx="1091821" cy="873457"/>
+          </a:xfrm>
+          <a:prstGeom prst="verticalScroll">
+            <a:avLst/>
+          </a:prstGeom>
+          <a:solidFill>
+            <a:schemeClr val="bg1"/>
+          </a:solidFill>
+        </p:spPr>
+        <p:style>
+          <a:lnRef idx="2">
+            <a:schemeClr val="accent1">
+              <a:shade val="15000"/>
+            </a:schemeClr>
+          </a:lnRef>
+          <a:fillRef idx="1">
+            <a:schemeClr val="accent1"/>
+          </a:fillRef>
+          <a:effectRef idx="0">
+            <a:schemeClr val="accent1"/>
+          </a:effectRef>
+          <a:fontRef idx="minor">
+            <a:schemeClr val="lt1"/>
+          </a:fontRef>
+        </p:style>
+        <p:txBody>
+          <a:bodyPr rtlCol="0" anchor="ctr"/>
+          <a:lstStyle/>
+          <a:p>
+            <a:pPr algn="ctr"/>
+            <a:r>
+              <a:rPr lang="en-US" sz="4400" b="1" dirty="0">
+                <a:solidFill>
+                  <a:schemeClr val="tx1"/>
+                </a:solidFill>
+              </a:rPr>
+              <a:t>6</a:t>
+            </a:r>
+          </a:p>
+        </p:txBody>
+      </p:sp>
+      <p:sp>
+        <p:nvSpPr>
+          <p:cNvPr id="14" name="TextBox 13">
+            <a:extLst>
+              <a:ext uri="{FF2B5EF4-FFF2-40B4-BE49-F238E27FC236}">
+                <a16:creationId xmlns:a16="http://schemas.microsoft.com/office/drawing/2014/main" id="{5E9C113D-AE55-F3B3-E221-1D8CA4D0EC80}"/>
+              </a:ext>
+            </a:extLst>
+          </p:cNvPr>
+          <p:cNvSpPr txBox="1"/>
+          <p:nvPr/>
+        </p:nvSpPr>
+        <p:spPr>
+          <a:xfrm>
+            <a:off x="1109533" y="259307"/>
+            <a:ext cx="4093941" cy="707886"/>
+          </a:xfrm>
+          <a:prstGeom prst="rect">
+            <a:avLst/>
+          </a:prstGeom>
+          <a:noFill/>
+        </p:spPr>
+        <p:txBody>
+          <a:bodyPr wrap="none" rtlCol="0">
+            <a:spAutoFit/>
+          </a:bodyPr>
+          <a:lstStyle/>
+          <a:p>
+            <a:r>
+              <a:rPr lang="en-US" sz="4000" b="1" dirty="0">
+                <a:latin typeface="Arial Black" panose="020B0A04020102020204" pitchFamily="34" charset="0"/>
+              </a:rPr>
+              <a:t>Week #11,#12</a:t>
+            </a:r>
+          </a:p>
+        </p:txBody>
+      </p:sp>
+      <p:pic>
+        <p:nvPicPr>
+          <p:cNvPr id="4" name="Picture 3">
+            <a:extLst>
+              <a:ext uri="{FF2B5EF4-FFF2-40B4-BE49-F238E27FC236}">
+                <a16:creationId xmlns:a16="http://schemas.microsoft.com/office/drawing/2014/main" id="{24FBDA0B-B184-63DE-F384-780E3E1EB3D5}"/>
+              </a:ext>
+            </a:extLst>
+          </p:cNvPr>
+          <p:cNvPicPr>
+            <a:picLocks noChangeAspect="1"/>
+          </p:cNvPicPr>
+          <p:nvPr/>
+        </p:nvPicPr>
+        <p:blipFill>
+          <a:blip r:embed="rId3">
+            <a:extLst>
+              <a:ext uri="{28A0092B-C50C-407E-A947-70E740481C1C}">
+                <a14:useLocalDpi xmlns:a14="http://schemas.microsoft.com/office/drawing/2010/main" val="0"/>
+              </a:ext>
+            </a:extLst>
+          </a:blip>
+          <a:stretch>
+            <a:fillRect/>
+          </a:stretch>
+        </p:blipFill>
+        <p:spPr>
+          <a:xfrm>
+            <a:off x="1647573" y="766696"/>
+            <a:ext cx="7111802" cy="5324607"/>
+          </a:xfrm>
+          <a:prstGeom prst="rect">
+            <a:avLst/>
+          </a:prstGeom>
+        </p:spPr>
+      </p:pic>
+    </p:spTree>
+    <p:extLst>
+      <p:ext uri="{BB962C8B-B14F-4D97-AF65-F5344CB8AC3E}">
+        <p14:creationId xmlns:p14="http://schemas.microsoft.com/office/powerpoint/2010/main" val="2209973011"/>
+      </p:ext>
+    </p:extLst>
+  </p:cSld>
+  <p:clrMapOvr>
+    <a:masterClrMapping/>
+  </p:clrMapOvr>
+</p:sld>
+</file>
+
+<file path=ppt/slides/slide7.xml><?xml version="1.0" encoding="utf-8"?>
+<p:sld xmlns:a="http://schemas.openxmlformats.org/drawingml/2006/main" xmlns:r="http://schemas.openxmlformats.org/officeDocument/2006/relationships" xmlns:p="http://schemas.openxmlformats.org/presentationml/2006/main">
+  <p:cSld>
+    <p:spTree>
+      <p:nvGrpSpPr>
+        <p:cNvPr id="1" name=""/>
+        <p:cNvGrpSpPr/>
+        <p:nvPr/>
+      </p:nvGrpSpPr>
+      <p:grpSpPr>
+        <a:xfrm>
+          <a:off x="0" y="0"/>
+          <a:ext cx="0" cy="0"/>
+          <a:chOff x="0" y="0"/>
+          <a:chExt cx="0" cy="0"/>
+        </a:xfrm>
+      </p:grpSpPr>
+      <p:pic>
+        <p:nvPicPr>
+          <p:cNvPr id="7" name="Picture 6">
+            <a:extLst>
+              <a:ext uri="{FF2B5EF4-FFF2-40B4-BE49-F238E27FC236}">
+                <a16:creationId xmlns:a16="http://schemas.microsoft.com/office/drawing/2014/main" id="{AD277A71-C5A3-2B53-25AA-A52C92EF6CC4}"/>
+              </a:ext>
+            </a:extLst>
+          </p:cNvPr>
+          <p:cNvPicPr>
+            <a:picLocks noChangeAspect="1"/>
+          </p:cNvPicPr>
+          <p:nvPr/>
+        </p:nvPicPr>
+        <p:blipFill>
+          <a:blip r:embed="rId2">
+            <a:extLst>
+              <a:ext uri="{28A0092B-C50C-407E-A947-70E740481C1C}">
+                <a14:useLocalDpi xmlns:a14="http://schemas.microsoft.com/office/drawing/2010/main" val="0"/>
+              </a:ext>
+            </a:extLst>
+          </a:blip>
+          <a:stretch>
+            <a:fillRect/>
+          </a:stretch>
+        </p:blipFill>
+        <p:spPr>
+          <a:xfrm>
+            <a:off x="0" y="4844958"/>
+            <a:ext cx="1915235" cy="1915235"/>
+          </a:xfrm>
+          <a:prstGeom prst="rect">
+            <a:avLst/>
+          </a:prstGeom>
+        </p:spPr>
+      </p:pic>
+      <p:sp>
+        <p:nvSpPr>
+          <p:cNvPr id="8" name="TextBox 7">
+            <a:extLst>
+              <a:ext uri="{FF2B5EF4-FFF2-40B4-BE49-F238E27FC236}">
+                <a16:creationId xmlns:a16="http://schemas.microsoft.com/office/drawing/2014/main" id="{0835D244-D79F-8F6B-3481-116553499408}"/>
+              </a:ext>
+            </a:extLst>
+          </p:cNvPr>
+          <p:cNvSpPr txBox="1"/>
+          <p:nvPr/>
+        </p:nvSpPr>
+        <p:spPr>
+          <a:xfrm>
+            <a:off x="9778558" y="259307"/>
+            <a:ext cx="2536272" cy="461665"/>
+          </a:xfrm>
+          <a:prstGeom prst="rect">
+            <a:avLst/>
+          </a:prstGeom>
+          <a:noFill/>
+        </p:spPr>
+        <p:txBody>
+          <a:bodyPr wrap="square" rtlCol="0">
+            <a:spAutoFit/>
+          </a:bodyPr>
+          <a:lstStyle/>
+          <a:p>
+            <a:r>
+              <a:rPr lang="en-US" sz="2400" b="1" dirty="0">
+                <a:solidFill>
+                  <a:schemeClr val="bg1"/>
+                </a:solidFill>
+                <a:latin typeface="Arial Black" panose="020B0A04020102020204" pitchFamily="34" charset="0"/>
+              </a:rPr>
+              <a:t>AI Academy</a:t>
+            </a:r>
+            <a:r>
+              <a:rPr lang="en-US" sz="2400" b="0" i="0" dirty="0">
+                <a:solidFill>
+                  <a:schemeClr val="bg1"/>
+                </a:solidFill>
+                <a:effectLst/>
+                <a:latin typeface="arial" panose="020B0604020202020204" pitchFamily="34" charset="0"/>
+              </a:rPr>
+              <a:t>®</a:t>
+            </a:r>
+            <a:endParaRPr lang="en-US" sz="2400" b="1" dirty="0">
+              <a:solidFill>
+                <a:schemeClr val="bg1"/>
+              </a:solidFill>
+              <a:latin typeface="Arial Black" panose="020B0A04020102020204" pitchFamily="34" charset="0"/>
+            </a:endParaRPr>
+          </a:p>
+        </p:txBody>
+      </p:sp>
+      <p:sp>
+        <p:nvSpPr>
+          <p:cNvPr id="13" name="Scroll: Vertical 12">
+            <a:extLst>
+              <a:ext uri="{FF2B5EF4-FFF2-40B4-BE49-F238E27FC236}">
+                <a16:creationId xmlns:a16="http://schemas.microsoft.com/office/drawing/2014/main" id="{BB80B18F-2B14-894E-57C6-EC163F824025}"/>
+              </a:ext>
+            </a:extLst>
+          </p:cNvPr>
+          <p:cNvSpPr/>
+          <p:nvPr/>
+        </p:nvSpPr>
+        <p:spPr>
+          <a:xfrm>
+            <a:off x="10459839" y="887102"/>
+            <a:ext cx="1091821" cy="873457"/>
+          </a:xfrm>
+          <a:prstGeom prst="verticalScroll">
+            <a:avLst/>
+          </a:prstGeom>
+          <a:solidFill>
+            <a:schemeClr val="bg1"/>
+          </a:solidFill>
+        </p:spPr>
+        <p:style>
+          <a:lnRef idx="2">
+            <a:schemeClr val="accent1">
+              <a:shade val="15000"/>
+            </a:schemeClr>
+          </a:lnRef>
+          <a:fillRef idx="1">
+            <a:schemeClr val="accent1"/>
+          </a:fillRef>
+          <a:effectRef idx="0">
+            <a:schemeClr val="accent1"/>
+          </a:effectRef>
+          <a:fontRef idx="minor">
+            <a:schemeClr val="lt1"/>
+          </a:fontRef>
+        </p:style>
+        <p:txBody>
+          <a:bodyPr rtlCol="0" anchor="ctr"/>
+          <a:lstStyle/>
+          <a:p>
+            <a:pPr algn="ctr"/>
+            <a:r>
+              <a:rPr lang="en-US" sz="4400" b="1" dirty="0">
+                <a:solidFill>
+                  <a:schemeClr val="tx1"/>
+                </a:solidFill>
+              </a:rPr>
+              <a:t>7</a:t>
+            </a:r>
+          </a:p>
+        </p:txBody>
+      </p:sp>
+      <p:sp>
+        <p:nvSpPr>
+          <p:cNvPr id="14" name="TextBox 13">
+            <a:extLst>
+              <a:ext uri="{FF2B5EF4-FFF2-40B4-BE49-F238E27FC236}">
+                <a16:creationId xmlns:a16="http://schemas.microsoft.com/office/drawing/2014/main" id="{5E9C113D-AE55-F3B3-E221-1D8CA4D0EC80}"/>
+              </a:ext>
+            </a:extLst>
+          </p:cNvPr>
+          <p:cNvSpPr txBox="1"/>
+          <p:nvPr/>
+        </p:nvSpPr>
+        <p:spPr>
+          <a:xfrm>
+            <a:off x="1109533" y="259307"/>
+            <a:ext cx="4093941" cy="707886"/>
+          </a:xfrm>
+          <a:prstGeom prst="rect">
+            <a:avLst/>
+          </a:prstGeom>
+          <a:noFill/>
+        </p:spPr>
+        <p:txBody>
+          <a:bodyPr wrap="none" rtlCol="0">
+            <a:spAutoFit/>
+          </a:bodyPr>
+          <a:lstStyle/>
+          <a:p>
+            <a:r>
+              <a:rPr lang="en-US" sz="4000" b="1" dirty="0">
+                <a:latin typeface="Arial Black" panose="020B0A04020102020204" pitchFamily="34" charset="0"/>
+              </a:rPr>
+              <a:t>Week #11,#12</a:t>
+            </a:r>
+          </a:p>
+        </p:txBody>
+      </p:sp>
+      <p:sp>
+        <p:nvSpPr>
+          <p:cNvPr id="5" name="TextBox 4">
+            <a:extLst>
+              <a:ext uri="{FF2B5EF4-FFF2-40B4-BE49-F238E27FC236}">
+                <a16:creationId xmlns:a16="http://schemas.microsoft.com/office/drawing/2014/main" id="{51542D92-CFF7-310F-40C9-F8D6EBACB0FB}"/>
+              </a:ext>
+            </a:extLst>
+          </p:cNvPr>
+          <p:cNvSpPr txBox="1"/>
+          <p:nvPr/>
+        </p:nvSpPr>
+        <p:spPr>
+          <a:xfrm>
+            <a:off x="2341219" y="1055075"/>
+            <a:ext cx="5721439" cy="1754326"/>
+          </a:xfrm>
+          <a:prstGeom prst="rect">
+            <a:avLst/>
+          </a:prstGeom>
+          <a:noFill/>
+        </p:spPr>
+        <p:txBody>
+          <a:bodyPr wrap="none" rtlCol="0">
+            <a:spAutoFit/>
+          </a:bodyPr>
+          <a:lstStyle/>
+          <a:p>
+            <a:pPr algn="ctr"/>
+            <a:r>
+              <a:rPr lang="en-US" sz="3600" b="1" dirty="0"/>
+              <a:t>See the Exercise Off </a:t>
+            </a:r>
+          </a:p>
+          <a:p>
+            <a:pPr algn="ctr"/>
+            <a:r>
+              <a:rPr lang="en-US" sz="3600" b="1" dirty="0"/>
+              <a:t>Laravel CRUD Application</a:t>
+            </a:r>
+          </a:p>
+          <a:p>
+            <a:pPr algn="ctr"/>
+            <a:r>
+              <a:rPr lang="en-US" sz="3600" b="1" dirty="0"/>
+              <a:t>On GitHub </a:t>
+            </a:r>
+            <a:r>
+              <a:rPr lang="en-US" sz="3600" b="1" dirty="0">
+                <a:solidFill>
+                  <a:srgbClr val="00B0F0"/>
+                </a:solidFill>
+              </a:rPr>
+              <a:t>@theaamirlatif</a:t>
+            </a:r>
+            <a:endParaRPr lang="en-PK" sz="3600" b="1" dirty="0">
+              <a:solidFill>
+                <a:srgbClr val="00B0F0"/>
+              </a:solidFill>
+            </a:endParaRPr>
+          </a:p>
+        </p:txBody>
+      </p:sp>
+      <p:pic>
+        <p:nvPicPr>
+          <p:cNvPr id="6" name="Picture 5">
+            <a:extLst>
+              <a:ext uri="{FF2B5EF4-FFF2-40B4-BE49-F238E27FC236}">
+                <a16:creationId xmlns:a16="http://schemas.microsoft.com/office/drawing/2014/main" id="{B66B7F6B-7746-E6B0-B978-A0EB13C45E0C}"/>
+              </a:ext>
+            </a:extLst>
+          </p:cNvPr>
+          <p:cNvPicPr>
+            <a:picLocks noChangeAspect="1"/>
+          </p:cNvPicPr>
+          <p:nvPr/>
+        </p:nvPicPr>
+        <p:blipFill>
+          <a:blip r:embed="rId3">
+            <a:extLst>
+              <a:ext uri="{28A0092B-C50C-407E-A947-70E740481C1C}">
+                <a14:useLocalDpi xmlns:a14="http://schemas.microsoft.com/office/drawing/2010/main" val="0"/>
+              </a:ext>
+            </a:extLst>
+          </a:blip>
+          <a:stretch>
+            <a:fillRect/>
+          </a:stretch>
+        </p:blipFill>
+        <p:spPr>
+          <a:xfrm>
+            <a:off x="3444607" y="2936011"/>
+            <a:ext cx="3514655" cy="3514655"/>
+          </a:xfrm>
+          <a:prstGeom prst="rect">
+            <a:avLst/>
+          </a:prstGeom>
+        </p:spPr>
+      </p:pic>
+    </p:spTree>
+    <p:extLst>
+      <p:ext uri="{BB962C8B-B14F-4D97-AF65-F5344CB8AC3E}">
+        <p14:creationId xmlns:p14="http://schemas.microsoft.com/office/powerpoint/2010/main" val="487421297"/>
+      </p:ext>
+    </p:extLst>
+  </p:cSld>
+  <p:clrMapOvr>
+    <a:masterClrMapping/>
+  </p:clrMapOvr>
+</p:sld>
+</file>
+
+<file path=ppt/slides/slide8.xml><?xml version="1.0" encoding="utf-8"?>
 <p:sld xmlns:a="http://schemas.openxmlformats.org/drawingml/2006/main" xmlns:r="http://schemas.openxmlformats.org/officeDocument/2006/relationships" xmlns:p="http://schemas.openxmlformats.org/presentationml/2006/main">
   <p:cSld>
     <p:spTree>
@@ -6303,7 +8094,7 @@
                   <a:schemeClr val="tx1"/>
                 </a:solidFill>
               </a:rPr>
-              <a:t>5</a:t>
+              <a:t>8</a:t>
             </a:r>
           </a:p>
         </p:txBody>
@@ -6322,8 +8113,8 @@
         </p:nvSpPr>
         <p:spPr>
           <a:xfrm>
-            <a:off x="1915235" y="1255590"/>
-            <a:ext cx="6450843" cy="3431196"/>
+            <a:off x="1915235" y="1503263"/>
+            <a:ext cx="7369442" cy="2020490"/>
           </a:xfrm>
           <a:prstGeom prst="rect">
             <a:avLst/>
@@ -6352,67 +8143,24 @@
             </a:r>
           </a:p>
           <a:p>
-            <a:pPr marL="1485900" lvl="2" indent="-571500">
+            <a:pPr>
               <a:lnSpc>
                 <a:spcPct val="150000"/>
               </a:lnSpc>
-              <a:buFont typeface="+mj-lt"/>
-              <a:buAutoNum type="romanUcPeriod"/>
             </a:pPr>
             <a:r>
-              <a:rPr lang="en-US" sz="2800" dirty="0">
+              <a:rPr lang="en-US" sz="3600" b="1" dirty="0">
                 <a:latin typeface="Times New Roman" panose="02020603050405020304" pitchFamily="18" charset="0"/>
                 <a:cs typeface="Times New Roman" panose="02020603050405020304" pitchFamily="18" charset="0"/>
               </a:rPr>
-              <a:t>Laravel Rest API’s</a:t>
-            </a:r>
-          </a:p>
-          <a:p>
-            <a:pPr marL="1485900" lvl="2" indent="-571500">
-              <a:lnSpc>
-                <a:spcPct val="150000"/>
-              </a:lnSpc>
-              <a:buFont typeface="+mj-lt"/>
-              <a:buAutoNum type="romanUcPeriod"/>
-            </a:pPr>
-            <a:r>
-              <a:rPr lang="en-US" sz="2800" dirty="0">
-                <a:latin typeface="Times New Roman" panose="02020603050405020304" pitchFamily="18" charset="0"/>
-                <a:cs typeface="Times New Roman" panose="02020603050405020304" pitchFamily="18" charset="0"/>
-              </a:rPr>
-              <a:t>Final Project Evaluation</a:t>
-            </a:r>
-          </a:p>
-          <a:p>
-            <a:pPr marL="1485900" lvl="2" indent="-571500">
-              <a:lnSpc>
-                <a:spcPct val="150000"/>
-              </a:lnSpc>
-              <a:buFont typeface="+mj-lt"/>
-              <a:buAutoNum type="romanUcPeriod"/>
-            </a:pPr>
-            <a:r>
-              <a:rPr lang="en-US" sz="2800" dirty="0">
+              <a:t>		</a:t>
+            </a:r>
+            <a:r>
+              <a:rPr lang="en-US" sz="5400" b="1" dirty="0">
                 <a:latin typeface="Times New Roman" panose="02020603050405020304" pitchFamily="18" charset="0"/>
                 <a:cs typeface="Times New Roman" panose="02020603050405020304" pitchFamily="18" charset="0"/>
               </a:rPr>
               <a:t>Final Term Exam</a:t>
-            </a:r>
-          </a:p>
-          <a:p>
-            <a:pPr marL="1485900" lvl="2" indent="-571500">
-              <a:lnSpc>
-                <a:spcPct val="150000"/>
-              </a:lnSpc>
-              <a:buFont typeface="+mj-lt"/>
-              <a:buAutoNum type="romanUcPeriod"/>
-            </a:pPr>
-            <a:r>
-              <a:rPr lang="en-US" sz="2800" dirty="0">
-                <a:latin typeface="Times New Roman" panose="02020603050405020304" pitchFamily="18" charset="0"/>
-                <a:cs typeface="Times New Roman" panose="02020603050405020304" pitchFamily="18" charset="0"/>
-              </a:rPr>
-              <a:t>Reviews &amp; Feedbacks</a:t>
             </a:r>
           </a:p>
         </p:txBody>

</xml_diff>